<commit_message>
switch zu Kazhaim Rycerz
</commit_message>
<xml_diff>
--- a/Shorty by DreamTeam.pptx
+++ b/Shorty by DreamTeam.pptx
@@ -13704,7 +13704,7 @@
         </p:blipFill>
         <p:spPr>
           <a:xfrm>
-            <a:off x="1162050" y="1587500"/>
+            <a:off x="1144761" y="2319020"/>
             <a:ext cx="9867900" cy="3683000"/>
           </a:xfrm>
           <a:prstGeom prst="rect">
@@ -13712,6 +13712,267 @@
           </a:prstGeom>
         </p:spPr>
       </p:pic>
+      <p:sp>
+        <p:nvSpPr>
+          <p:cNvPr id="7" name="Untertitel 2">
+            <a:extLst>
+              <a:ext uri="{FF2B5EF4-FFF2-40B4-BE49-F238E27FC236}">
+                <a16:creationId xmlns:a16="http://schemas.microsoft.com/office/drawing/2014/main" id="{8BB4A677-C4C3-C7E9-7BB6-670B9C5B6EF7}"/>
+              </a:ext>
+            </a:extLst>
+          </p:cNvPr>
+          <p:cNvSpPr txBox="1">
+            <a:spLocks/>
+          </p:cNvSpPr>
+          <p:nvPr/>
+        </p:nvSpPr>
+        <p:spPr bwMode="gray">
+          <a:xfrm>
+            <a:off x="1179339" y="1688172"/>
+            <a:ext cx="8825658" cy="563880"/>
+          </a:xfrm>
+          <a:prstGeom prst="rect">
+            <a:avLst/>
+          </a:prstGeom>
+        </p:spPr>
+        <p:txBody>
+          <a:bodyPr vert="horz" lIns="91440" tIns="45720" rIns="91440" bIns="45720" rtlCol="0" anchor="t">
+            <a:normAutofit/>
+          </a:bodyPr>
+          <a:lstStyle>
+            <a:lvl1pPr marL="0" indent="0" algn="l" defTabSz="457200" rtl="0" eaLnBrk="1" latinLnBrk="0" hangingPunct="1">
+              <a:spcBef>
+                <a:spcPts val="1000"/>
+              </a:spcBef>
+              <a:spcAft>
+                <a:spcPts val="0"/>
+              </a:spcAft>
+              <a:buClr>
+                <a:schemeClr val="accent1"/>
+              </a:buClr>
+              <a:buSzPct val="80000"/>
+              <a:buFont typeface="Wingdings 3" charset="2"/>
+              <a:buNone/>
+              <a:defRPr sz="1800" b="0" i="0" kern="1200" cap="all">
+                <a:solidFill>
+                  <a:schemeClr val="accent1">
+                    <a:lumMod val="60000"/>
+                    <a:lumOff val="40000"/>
+                  </a:schemeClr>
+                </a:solidFill>
+                <a:latin typeface="+mn-lt"/>
+                <a:ea typeface="+mn-ea"/>
+                <a:cs typeface="+mn-cs"/>
+              </a:defRPr>
+            </a:lvl1pPr>
+            <a:lvl2pPr marL="457200" indent="0" algn="ctr" defTabSz="457200" rtl="0" eaLnBrk="1" latinLnBrk="0" hangingPunct="1">
+              <a:spcBef>
+                <a:spcPts val="1000"/>
+              </a:spcBef>
+              <a:spcAft>
+                <a:spcPts val="0"/>
+              </a:spcAft>
+              <a:buClr>
+                <a:schemeClr val="accent1"/>
+              </a:buClr>
+              <a:buSzPct val="80000"/>
+              <a:buFont typeface="Wingdings 3" charset="2"/>
+              <a:buNone/>
+              <a:defRPr sz="1600" b="0" i="0" kern="1200">
+                <a:solidFill>
+                  <a:schemeClr val="tx1">
+                    <a:tint val="75000"/>
+                  </a:schemeClr>
+                </a:solidFill>
+                <a:latin typeface="+mn-lt"/>
+                <a:ea typeface="+mn-ea"/>
+                <a:cs typeface="+mn-cs"/>
+              </a:defRPr>
+            </a:lvl2pPr>
+            <a:lvl3pPr marL="914400" indent="0" algn="ctr" defTabSz="457200" rtl="0" eaLnBrk="1" latinLnBrk="0" hangingPunct="1">
+              <a:spcBef>
+                <a:spcPts val="1000"/>
+              </a:spcBef>
+              <a:spcAft>
+                <a:spcPts val="0"/>
+              </a:spcAft>
+              <a:buClr>
+                <a:schemeClr val="accent1"/>
+              </a:buClr>
+              <a:buSzPct val="80000"/>
+              <a:buFont typeface="Wingdings 3" charset="2"/>
+              <a:buNone/>
+              <a:defRPr sz="1400" b="0" i="0" kern="1200">
+                <a:solidFill>
+                  <a:schemeClr val="tx1">
+                    <a:tint val="75000"/>
+                  </a:schemeClr>
+                </a:solidFill>
+                <a:latin typeface="+mn-lt"/>
+                <a:ea typeface="+mn-ea"/>
+                <a:cs typeface="+mn-cs"/>
+              </a:defRPr>
+            </a:lvl3pPr>
+            <a:lvl4pPr marL="1371600" indent="0" algn="ctr" defTabSz="457200" rtl="0" eaLnBrk="1" latinLnBrk="0" hangingPunct="1">
+              <a:spcBef>
+                <a:spcPts val="1000"/>
+              </a:spcBef>
+              <a:spcAft>
+                <a:spcPts val="0"/>
+              </a:spcAft>
+              <a:buClr>
+                <a:schemeClr val="accent1"/>
+              </a:buClr>
+              <a:buSzPct val="80000"/>
+              <a:buFont typeface="Wingdings 3" charset="2"/>
+              <a:buNone/>
+              <a:defRPr sz="1200" b="0" i="0" kern="1200">
+                <a:solidFill>
+                  <a:schemeClr val="tx1">
+                    <a:tint val="75000"/>
+                  </a:schemeClr>
+                </a:solidFill>
+                <a:latin typeface="+mn-lt"/>
+                <a:ea typeface="+mn-ea"/>
+                <a:cs typeface="+mn-cs"/>
+              </a:defRPr>
+            </a:lvl4pPr>
+            <a:lvl5pPr marL="1828800" indent="0" algn="ctr" defTabSz="457200" rtl="0" eaLnBrk="1" latinLnBrk="0" hangingPunct="1">
+              <a:spcBef>
+                <a:spcPts val="1000"/>
+              </a:spcBef>
+              <a:spcAft>
+                <a:spcPts val="0"/>
+              </a:spcAft>
+              <a:buClr>
+                <a:schemeClr val="accent1"/>
+              </a:buClr>
+              <a:buSzPct val="80000"/>
+              <a:buFont typeface="Wingdings 3" charset="2"/>
+              <a:buNone/>
+              <a:defRPr sz="1200" b="0" i="0" kern="1200">
+                <a:solidFill>
+                  <a:schemeClr val="tx1">
+                    <a:tint val="75000"/>
+                  </a:schemeClr>
+                </a:solidFill>
+                <a:latin typeface="+mn-lt"/>
+                <a:ea typeface="+mn-ea"/>
+                <a:cs typeface="+mn-cs"/>
+              </a:defRPr>
+            </a:lvl5pPr>
+            <a:lvl6pPr marL="2286000" indent="0" algn="ctr" defTabSz="457200" rtl="0" eaLnBrk="1" latinLnBrk="0" hangingPunct="1">
+              <a:spcBef>
+                <a:spcPts val="1000"/>
+              </a:spcBef>
+              <a:spcAft>
+                <a:spcPts val="0"/>
+              </a:spcAft>
+              <a:buClr>
+                <a:schemeClr val="accent1"/>
+              </a:buClr>
+              <a:buSzPct val="80000"/>
+              <a:buFont typeface="Wingdings 3" charset="2"/>
+              <a:buNone/>
+              <a:defRPr sz="1200" b="0" i="0" kern="1200">
+                <a:solidFill>
+                  <a:schemeClr val="tx1">
+                    <a:tint val="75000"/>
+                  </a:schemeClr>
+                </a:solidFill>
+                <a:latin typeface="+mn-lt"/>
+                <a:ea typeface="+mn-ea"/>
+                <a:cs typeface="+mn-cs"/>
+              </a:defRPr>
+            </a:lvl6pPr>
+            <a:lvl7pPr marL="2743200" indent="0" algn="ctr" defTabSz="457200" rtl="0" eaLnBrk="1" latinLnBrk="0" hangingPunct="1">
+              <a:spcBef>
+                <a:spcPts val="1000"/>
+              </a:spcBef>
+              <a:spcAft>
+                <a:spcPts val="0"/>
+              </a:spcAft>
+              <a:buClr>
+                <a:schemeClr val="accent1"/>
+              </a:buClr>
+              <a:buSzPct val="80000"/>
+              <a:buFont typeface="Wingdings 3" charset="2"/>
+              <a:buNone/>
+              <a:defRPr sz="1200" b="0" i="0" kern="1200">
+                <a:solidFill>
+                  <a:schemeClr val="tx1">
+                    <a:tint val="75000"/>
+                  </a:schemeClr>
+                </a:solidFill>
+                <a:latin typeface="+mn-lt"/>
+                <a:ea typeface="+mn-ea"/>
+                <a:cs typeface="+mn-cs"/>
+              </a:defRPr>
+            </a:lvl7pPr>
+            <a:lvl8pPr marL="3200400" indent="0" algn="ctr" defTabSz="457200" rtl="0" eaLnBrk="1" latinLnBrk="0" hangingPunct="1">
+              <a:spcBef>
+                <a:spcPts val="1000"/>
+              </a:spcBef>
+              <a:spcAft>
+                <a:spcPts val="0"/>
+              </a:spcAft>
+              <a:buClr>
+                <a:schemeClr val="accent1"/>
+              </a:buClr>
+              <a:buSzPct val="80000"/>
+              <a:buFont typeface="Wingdings 3" charset="2"/>
+              <a:buNone/>
+              <a:defRPr sz="1200" b="0" i="0" kern="1200">
+                <a:solidFill>
+                  <a:schemeClr val="tx1">
+                    <a:tint val="75000"/>
+                  </a:schemeClr>
+                </a:solidFill>
+                <a:latin typeface="+mn-lt"/>
+                <a:ea typeface="+mn-ea"/>
+                <a:cs typeface="+mn-cs"/>
+              </a:defRPr>
+            </a:lvl8pPr>
+            <a:lvl9pPr marL="3657600" indent="0" algn="ctr" defTabSz="457200" rtl="0" eaLnBrk="1" latinLnBrk="0" hangingPunct="1">
+              <a:spcBef>
+                <a:spcPts val="1000"/>
+              </a:spcBef>
+              <a:spcAft>
+                <a:spcPts val="0"/>
+              </a:spcAft>
+              <a:buClr>
+                <a:schemeClr val="accent1"/>
+              </a:buClr>
+              <a:buSzPct val="80000"/>
+              <a:buFont typeface="Wingdings 3" charset="2"/>
+              <a:buNone/>
+              <a:defRPr sz="1200" b="0" i="0" kern="1200">
+                <a:solidFill>
+                  <a:schemeClr val="tx1">
+                    <a:tint val="75000"/>
+                  </a:schemeClr>
+                </a:solidFill>
+                <a:latin typeface="+mn-lt"/>
+                <a:ea typeface="+mn-ea"/>
+                <a:cs typeface="+mn-cs"/>
+              </a:defRPr>
+            </a:lvl9pPr>
+          </a:lstStyle>
+          <a:p>
+            <a:r>
+              <a:rPr lang="de-DE" cap="none" dirty="0"/>
+              <a:t>Funktionstest Gradient Color / Shorty-Ente</a:t>
+            </a:r>
+          </a:p>
+          <a:p>
+            <a:pPr marL="285750" indent="-285750">
+              <a:buFont typeface="Wingdings" pitchFamily="2" charset="2"/>
+              <a:buChar char="è"/>
+            </a:pPr>
+            <a:endParaRPr lang="de-DE" cap="none" dirty="0"/>
+          </a:p>
+        </p:txBody>
+      </p:sp>
     </p:spTree>
     <p:extLst>
       <p:ext uri="{BB962C8B-B14F-4D97-AF65-F5344CB8AC3E}">
@@ -13857,6 +14118,267 @@
           </a:prstGeom>
         </p:spPr>
       </p:pic>
+      <p:sp>
+        <p:nvSpPr>
+          <p:cNvPr id="7" name="Untertitel 2">
+            <a:extLst>
+              <a:ext uri="{FF2B5EF4-FFF2-40B4-BE49-F238E27FC236}">
+                <a16:creationId xmlns:a16="http://schemas.microsoft.com/office/drawing/2014/main" id="{F47DFE1B-0BD5-2864-082C-87D851029084}"/>
+              </a:ext>
+            </a:extLst>
+          </p:cNvPr>
+          <p:cNvSpPr txBox="1">
+            <a:spLocks/>
+          </p:cNvSpPr>
+          <p:nvPr/>
+        </p:nvSpPr>
+        <p:spPr bwMode="gray">
+          <a:xfrm>
+            <a:off x="1179339" y="1688172"/>
+            <a:ext cx="8825658" cy="563880"/>
+          </a:xfrm>
+          <a:prstGeom prst="rect">
+            <a:avLst/>
+          </a:prstGeom>
+        </p:spPr>
+        <p:txBody>
+          <a:bodyPr vert="horz" lIns="91440" tIns="45720" rIns="91440" bIns="45720" rtlCol="0" anchor="t">
+            <a:normAutofit/>
+          </a:bodyPr>
+          <a:lstStyle>
+            <a:lvl1pPr marL="0" indent="0" algn="l" defTabSz="457200" rtl="0" eaLnBrk="1" latinLnBrk="0" hangingPunct="1">
+              <a:spcBef>
+                <a:spcPts val="1000"/>
+              </a:spcBef>
+              <a:spcAft>
+                <a:spcPts val="0"/>
+              </a:spcAft>
+              <a:buClr>
+                <a:schemeClr val="accent1"/>
+              </a:buClr>
+              <a:buSzPct val="80000"/>
+              <a:buFont typeface="Wingdings 3" charset="2"/>
+              <a:buNone/>
+              <a:defRPr sz="1800" b="0" i="0" kern="1200" cap="all">
+                <a:solidFill>
+                  <a:schemeClr val="accent1">
+                    <a:lumMod val="60000"/>
+                    <a:lumOff val="40000"/>
+                  </a:schemeClr>
+                </a:solidFill>
+                <a:latin typeface="+mn-lt"/>
+                <a:ea typeface="+mn-ea"/>
+                <a:cs typeface="+mn-cs"/>
+              </a:defRPr>
+            </a:lvl1pPr>
+            <a:lvl2pPr marL="457200" indent="0" algn="ctr" defTabSz="457200" rtl="0" eaLnBrk="1" latinLnBrk="0" hangingPunct="1">
+              <a:spcBef>
+                <a:spcPts val="1000"/>
+              </a:spcBef>
+              <a:spcAft>
+                <a:spcPts val="0"/>
+              </a:spcAft>
+              <a:buClr>
+                <a:schemeClr val="accent1"/>
+              </a:buClr>
+              <a:buSzPct val="80000"/>
+              <a:buFont typeface="Wingdings 3" charset="2"/>
+              <a:buNone/>
+              <a:defRPr sz="1600" b="0" i="0" kern="1200">
+                <a:solidFill>
+                  <a:schemeClr val="tx1">
+                    <a:tint val="75000"/>
+                  </a:schemeClr>
+                </a:solidFill>
+                <a:latin typeface="+mn-lt"/>
+                <a:ea typeface="+mn-ea"/>
+                <a:cs typeface="+mn-cs"/>
+              </a:defRPr>
+            </a:lvl2pPr>
+            <a:lvl3pPr marL="914400" indent="0" algn="ctr" defTabSz="457200" rtl="0" eaLnBrk="1" latinLnBrk="0" hangingPunct="1">
+              <a:spcBef>
+                <a:spcPts val="1000"/>
+              </a:spcBef>
+              <a:spcAft>
+                <a:spcPts val="0"/>
+              </a:spcAft>
+              <a:buClr>
+                <a:schemeClr val="accent1"/>
+              </a:buClr>
+              <a:buSzPct val="80000"/>
+              <a:buFont typeface="Wingdings 3" charset="2"/>
+              <a:buNone/>
+              <a:defRPr sz="1400" b="0" i="0" kern="1200">
+                <a:solidFill>
+                  <a:schemeClr val="tx1">
+                    <a:tint val="75000"/>
+                  </a:schemeClr>
+                </a:solidFill>
+                <a:latin typeface="+mn-lt"/>
+                <a:ea typeface="+mn-ea"/>
+                <a:cs typeface="+mn-cs"/>
+              </a:defRPr>
+            </a:lvl3pPr>
+            <a:lvl4pPr marL="1371600" indent="0" algn="ctr" defTabSz="457200" rtl="0" eaLnBrk="1" latinLnBrk="0" hangingPunct="1">
+              <a:spcBef>
+                <a:spcPts val="1000"/>
+              </a:spcBef>
+              <a:spcAft>
+                <a:spcPts val="0"/>
+              </a:spcAft>
+              <a:buClr>
+                <a:schemeClr val="accent1"/>
+              </a:buClr>
+              <a:buSzPct val="80000"/>
+              <a:buFont typeface="Wingdings 3" charset="2"/>
+              <a:buNone/>
+              <a:defRPr sz="1200" b="0" i="0" kern="1200">
+                <a:solidFill>
+                  <a:schemeClr val="tx1">
+                    <a:tint val="75000"/>
+                  </a:schemeClr>
+                </a:solidFill>
+                <a:latin typeface="+mn-lt"/>
+                <a:ea typeface="+mn-ea"/>
+                <a:cs typeface="+mn-cs"/>
+              </a:defRPr>
+            </a:lvl4pPr>
+            <a:lvl5pPr marL="1828800" indent="0" algn="ctr" defTabSz="457200" rtl="0" eaLnBrk="1" latinLnBrk="0" hangingPunct="1">
+              <a:spcBef>
+                <a:spcPts val="1000"/>
+              </a:spcBef>
+              <a:spcAft>
+                <a:spcPts val="0"/>
+              </a:spcAft>
+              <a:buClr>
+                <a:schemeClr val="accent1"/>
+              </a:buClr>
+              <a:buSzPct val="80000"/>
+              <a:buFont typeface="Wingdings 3" charset="2"/>
+              <a:buNone/>
+              <a:defRPr sz="1200" b="0" i="0" kern="1200">
+                <a:solidFill>
+                  <a:schemeClr val="tx1">
+                    <a:tint val="75000"/>
+                  </a:schemeClr>
+                </a:solidFill>
+                <a:latin typeface="+mn-lt"/>
+                <a:ea typeface="+mn-ea"/>
+                <a:cs typeface="+mn-cs"/>
+              </a:defRPr>
+            </a:lvl5pPr>
+            <a:lvl6pPr marL="2286000" indent="0" algn="ctr" defTabSz="457200" rtl="0" eaLnBrk="1" latinLnBrk="0" hangingPunct="1">
+              <a:spcBef>
+                <a:spcPts val="1000"/>
+              </a:spcBef>
+              <a:spcAft>
+                <a:spcPts val="0"/>
+              </a:spcAft>
+              <a:buClr>
+                <a:schemeClr val="accent1"/>
+              </a:buClr>
+              <a:buSzPct val="80000"/>
+              <a:buFont typeface="Wingdings 3" charset="2"/>
+              <a:buNone/>
+              <a:defRPr sz="1200" b="0" i="0" kern="1200">
+                <a:solidFill>
+                  <a:schemeClr val="tx1">
+                    <a:tint val="75000"/>
+                  </a:schemeClr>
+                </a:solidFill>
+                <a:latin typeface="+mn-lt"/>
+                <a:ea typeface="+mn-ea"/>
+                <a:cs typeface="+mn-cs"/>
+              </a:defRPr>
+            </a:lvl6pPr>
+            <a:lvl7pPr marL="2743200" indent="0" algn="ctr" defTabSz="457200" rtl="0" eaLnBrk="1" latinLnBrk="0" hangingPunct="1">
+              <a:spcBef>
+                <a:spcPts val="1000"/>
+              </a:spcBef>
+              <a:spcAft>
+                <a:spcPts val="0"/>
+              </a:spcAft>
+              <a:buClr>
+                <a:schemeClr val="accent1"/>
+              </a:buClr>
+              <a:buSzPct val="80000"/>
+              <a:buFont typeface="Wingdings 3" charset="2"/>
+              <a:buNone/>
+              <a:defRPr sz="1200" b="0" i="0" kern="1200">
+                <a:solidFill>
+                  <a:schemeClr val="tx1">
+                    <a:tint val="75000"/>
+                  </a:schemeClr>
+                </a:solidFill>
+                <a:latin typeface="+mn-lt"/>
+                <a:ea typeface="+mn-ea"/>
+                <a:cs typeface="+mn-cs"/>
+              </a:defRPr>
+            </a:lvl7pPr>
+            <a:lvl8pPr marL="3200400" indent="0" algn="ctr" defTabSz="457200" rtl="0" eaLnBrk="1" latinLnBrk="0" hangingPunct="1">
+              <a:spcBef>
+                <a:spcPts val="1000"/>
+              </a:spcBef>
+              <a:spcAft>
+                <a:spcPts val="0"/>
+              </a:spcAft>
+              <a:buClr>
+                <a:schemeClr val="accent1"/>
+              </a:buClr>
+              <a:buSzPct val="80000"/>
+              <a:buFont typeface="Wingdings 3" charset="2"/>
+              <a:buNone/>
+              <a:defRPr sz="1200" b="0" i="0" kern="1200">
+                <a:solidFill>
+                  <a:schemeClr val="tx1">
+                    <a:tint val="75000"/>
+                  </a:schemeClr>
+                </a:solidFill>
+                <a:latin typeface="+mn-lt"/>
+                <a:ea typeface="+mn-ea"/>
+                <a:cs typeface="+mn-cs"/>
+              </a:defRPr>
+            </a:lvl8pPr>
+            <a:lvl9pPr marL="3657600" indent="0" algn="ctr" defTabSz="457200" rtl="0" eaLnBrk="1" latinLnBrk="0" hangingPunct="1">
+              <a:spcBef>
+                <a:spcPts val="1000"/>
+              </a:spcBef>
+              <a:spcAft>
+                <a:spcPts val="0"/>
+              </a:spcAft>
+              <a:buClr>
+                <a:schemeClr val="accent1"/>
+              </a:buClr>
+              <a:buSzPct val="80000"/>
+              <a:buFont typeface="Wingdings 3" charset="2"/>
+              <a:buNone/>
+              <a:defRPr sz="1200" b="0" i="0" kern="1200">
+                <a:solidFill>
+                  <a:schemeClr val="tx1">
+                    <a:tint val="75000"/>
+                  </a:schemeClr>
+                </a:solidFill>
+                <a:latin typeface="+mn-lt"/>
+                <a:ea typeface="+mn-ea"/>
+                <a:cs typeface="+mn-cs"/>
+              </a:defRPr>
+            </a:lvl9pPr>
+          </a:lstStyle>
+          <a:p>
+            <a:r>
+              <a:rPr lang="de-DE" cap="none" dirty="0"/>
+              <a:t>Funktionstest Textelemente</a:t>
+            </a:r>
+          </a:p>
+          <a:p>
+            <a:pPr marL="285750" indent="-285750">
+              <a:buFont typeface="Wingdings" pitchFamily="2" charset="2"/>
+              <a:buChar char="è"/>
+            </a:pPr>
+            <a:endParaRPr lang="de-DE" cap="none" dirty="0"/>
+          </a:p>
+        </p:txBody>
+      </p:sp>
     </p:spTree>
     <p:extLst>
       <p:ext uri="{BB962C8B-B14F-4D97-AF65-F5344CB8AC3E}">
@@ -14002,6 +14524,267 @@
           </a:prstGeom>
         </p:spPr>
       </p:pic>
+      <p:sp>
+        <p:nvSpPr>
+          <p:cNvPr id="7" name="Untertitel 2">
+            <a:extLst>
+              <a:ext uri="{FF2B5EF4-FFF2-40B4-BE49-F238E27FC236}">
+                <a16:creationId xmlns:a16="http://schemas.microsoft.com/office/drawing/2014/main" id="{4711ADF0-22B6-47A5-CAC1-AFAB8CCD00E0}"/>
+              </a:ext>
+            </a:extLst>
+          </p:cNvPr>
+          <p:cNvSpPr txBox="1">
+            <a:spLocks/>
+          </p:cNvSpPr>
+          <p:nvPr/>
+        </p:nvSpPr>
+        <p:spPr bwMode="gray">
+          <a:xfrm>
+            <a:off x="1179339" y="1688172"/>
+            <a:ext cx="8825658" cy="563880"/>
+          </a:xfrm>
+          <a:prstGeom prst="rect">
+            <a:avLst/>
+          </a:prstGeom>
+        </p:spPr>
+        <p:txBody>
+          <a:bodyPr vert="horz" lIns="91440" tIns="45720" rIns="91440" bIns="45720" rtlCol="0" anchor="t">
+            <a:normAutofit/>
+          </a:bodyPr>
+          <a:lstStyle>
+            <a:lvl1pPr marL="0" indent="0" algn="l" defTabSz="457200" rtl="0" eaLnBrk="1" latinLnBrk="0" hangingPunct="1">
+              <a:spcBef>
+                <a:spcPts val="1000"/>
+              </a:spcBef>
+              <a:spcAft>
+                <a:spcPts val="0"/>
+              </a:spcAft>
+              <a:buClr>
+                <a:schemeClr val="accent1"/>
+              </a:buClr>
+              <a:buSzPct val="80000"/>
+              <a:buFont typeface="Wingdings 3" charset="2"/>
+              <a:buNone/>
+              <a:defRPr sz="1800" b="0" i="0" kern="1200" cap="all">
+                <a:solidFill>
+                  <a:schemeClr val="accent1">
+                    <a:lumMod val="60000"/>
+                    <a:lumOff val="40000"/>
+                  </a:schemeClr>
+                </a:solidFill>
+                <a:latin typeface="+mn-lt"/>
+                <a:ea typeface="+mn-ea"/>
+                <a:cs typeface="+mn-cs"/>
+              </a:defRPr>
+            </a:lvl1pPr>
+            <a:lvl2pPr marL="457200" indent="0" algn="ctr" defTabSz="457200" rtl="0" eaLnBrk="1" latinLnBrk="0" hangingPunct="1">
+              <a:spcBef>
+                <a:spcPts val="1000"/>
+              </a:spcBef>
+              <a:spcAft>
+                <a:spcPts val="0"/>
+              </a:spcAft>
+              <a:buClr>
+                <a:schemeClr val="accent1"/>
+              </a:buClr>
+              <a:buSzPct val="80000"/>
+              <a:buFont typeface="Wingdings 3" charset="2"/>
+              <a:buNone/>
+              <a:defRPr sz="1600" b="0" i="0" kern="1200">
+                <a:solidFill>
+                  <a:schemeClr val="tx1">
+                    <a:tint val="75000"/>
+                  </a:schemeClr>
+                </a:solidFill>
+                <a:latin typeface="+mn-lt"/>
+                <a:ea typeface="+mn-ea"/>
+                <a:cs typeface="+mn-cs"/>
+              </a:defRPr>
+            </a:lvl2pPr>
+            <a:lvl3pPr marL="914400" indent="0" algn="ctr" defTabSz="457200" rtl="0" eaLnBrk="1" latinLnBrk="0" hangingPunct="1">
+              <a:spcBef>
+                <a:spcPts val="1000"/>
+              </a:spcBef>
+              <a:spcAft>
+                <a:spcPts val="0"/>
+              </a:spcAft>
+              <a:buClr>
+                <a:schemeClr val="accent1"/>
+              </a:buClr>
+              <a:buSzPct val="80000"/>
+              <a:buFont typeface="Wingdings 3" charset="2"/>
+              <a:buNone/>
+              <a:defRPr sz="1400" b="0" i="0" kern="1200">
+                <a:solidFill>
+                  <a:schemeClr val="tx1">
+                    <a:tint val="75000"/>
+                  </a:schemeClr>
+                </a:solidFill>
+                <a:latin typeface="+mn-lt"/>
+                <a:ea typeface="+mn-ea"/>
+                <a:cs typeface="+mn-cs"/>
+              </a:defRPr>
+            </a:lvl3pPr>
+            <a:lvl4pPr marL="1371600" indent="0" algn="ctr" defTabSz="457200" rtl="0" eaLnBrk="1" latinLnBrk="0" hangingPunct="1">
+              <a:spcBef>
+                <a:spcPts val="1000"/>
+              </a:spcBef>
+              <a:spcAft>
+                <a:spcPts val="0"/>
+              </a:spcAft>
+              <a:buClr>
+                <a:schemeClr val="accent1"/>
+              </a:buClr>
+              <a:buSzPct val="80000"/>
+              <a:buFont typeface="Wingdings 3" charset="2"/>
+              <a:buNone/>
+              <a:defRPr sz="1200" b="0" i="0" kern="1200">
+                <a:solidFill>
+                  <a:schemeClr val="tx1">
+                    <a:tint val="75000"/>
+                  </a:schemeClr>
+                </a:solidFill>
+                <a:latin typeface="+mn-lt"/>
+                <a:ea typeface="+mn-ea"/>
+                <a:cs typeface="+mn-cs"/>
+              </a:defRPr>
+            </a:lvl4pPr>
+            <a:lvl5pPr marL="1828800" indent="0" algn="ctr" defTabSz="457200" rtl="0" eaLnBrk="1" latinLnBrk="0" hangingPunct="1">
+              <a:spcBef>
+                <a:spcPts val="1000"/>
+              </a:spcBef>
+              <a:spcAft>
+                <a:spcPts val="0"/>
+              </a:spcAft>
+              <a:buClr>
+                <a:schemeClr val="accent1"/>
+              </a:buClr>
+              <a:buSzPct val="80000"/>
+              <a:buFont typeface="Wingdings 3" charset="2"/>
+              <a:buNone/>
+              <a:defRPr sz="1200" b="0" i="0" kern="1200">
+                <a:solidFill>
+                  <a:schemeClr val="tx1">
+                    <a:tint val="75000"/>
+                  </a:schemeClr>
+                </a:solidFill>
+                <a:latin typeface="+mn-lt"/>
+                <a:ea typeface="+mn-ea"/>
+                <a:cs typeface="+mn-cs"/>
+              </a:defRPr>
+            </a:lvl5pPr>
+            <a:lvl6pPr marL="2286000" indent="0" algn="ctr" defTabSz="457200" rtl="0" eaLnBrk="1" latinLnBrk="0" hangingPunct="1">
+              <a:spcBef>
+                <a:spcPts val="1000"/>
+              </a:spcBef>
+              <a:spcAft>
+                <a:spcPts val="0"/>
+              </a:spcAft>
+              <a:buClr>
+                <a:schemeClr val="accent1"/>
+              </a:buClr>
+              <a:buSzPct val="80000"/>
+              <a:buFont typeface="Wingdings 3" charset="2"/>
+              <a:buNone/>
+              <a:defRPr sz="1200" b="0" i="0" kern="1200">
+                <a:solidFill>
+                  <a:schemeClr val="tx1">
+                    <a:tint val="75000"/>
+                  </a:schemeClr>
+                </a:solidFill>
+                <a:latin typeface="+mn-lt"/>
+                <a:ea typeface="+mn-ea"/>
+                <a:cs typeface="+mn-cs"/>
+              </a:defRPr>
+            </a:lvl6pPr>
+            <a:lvl7pPr marL="2743200" indent="0" algn="ctr" defTabSz="457200" rtl="0" eaLnBrk="1" latinLnBrk="0" hangingPunct="1">
+              <a:spcBef>
+                <a:spcPts val="1000"/>
+              </a:spcBef>
+              <a:spcAft>
+                <a:spcPts val="0"/>
+              </a:spcAft>
+              <a:buClr>
+                <a:schemeClr val="accent1"/>
+              </a:buClr>
+              <a:buSzPct val="80000"/>
+              <a:buFont typeface="Wingdings 3" charset="2"/>
+              <a:buNone/>
+              <a:defRPr sz="1200" b="0" i="0" kern="1200">
+                <a:solidFill>
+                  <a:schemeClr val="tx1">
+                    <a:tint val="75000"/>
+                  </a:schemeClr>
+                </a:solidFill>
+                <a:latin typeface="+mn-lt"/>
+                <a:ea typeface="+mn-ea"/>
+                <a:cs typeface="+mn-cs"/>
+              </a:defRPr>
+            </a:lvl7pPr>
+            <a:lvl8pPr marL="3200400" indent="0" algn="ctr" defTabSz="457200" rtl="0" eaLnBrk="1" latinLnBrk="0" hangingPunct="1">
+              <a:spcBef>
+                <a:spcPts val="1000"/>
+              </a:spcBef>
+              <a:spcAft>
+                <a:spcPts val="0"/>
+              </a:spcAft>
+              <a:buClr>
+                <a:schemeClr val="accent1"/>
+              </a:buClr>
+              <a:buSzPct val="80000"/>
+              <a:buFont typeface="Wingdings 3" charset="2"/>
+              <a:buNone/>
+              <a:defRPr sz="1200" b="0" i="0" kern="1200">
+                <a:solidFill>
+                  <a:schemeClr val="tx1">
+                    <a:tint val="75000"/>
+                  </a:schemeClr>
+                </a:solidFill>
+                <a:latin typeface="+mn-lt"/>
+                <a:ea typeface="+mn-ea"/>
+                <a:cs typeface="+mn-cs"/>
+              </a:defRPr>
+            </a:lvl8pPr>
+            <a:lvl9pPr marL="3657600" indent="0" algn="ctr" defTabSz="457200" rtl="0" eaLnBrk="1" latinLnBrk="0" hangingPunct="1">
+              <a:spcBef>
+                <a:spcPts val="1000"/>
+              </a:spcBef>
+              <a:spcAft>
+                <a:spcPts val="0"/>
+              </a:spcAft>
+              <a:buClr>
+                <a:schemeClr val="accent1"/>
+              </a:buClr>
+              <a:buSzPct val="80000"/>
+              <a:buFont typeface="Wingdings 3" charset="2"/>
+              <a:buNone/>
+              <a:defRPr sz="1200" b="0" i="0" kern="1200">
+                <a:solidFill>
+                  <a:schemeClr val="tx1">
+                    <a:tint val="75000"/>
+                  </a:schemeClr>
+                </a:solidFill>
+                <a:latin typeface="+mn-lt"/>
+                <a:ea typeface="+mn-ea"/>
+                <a:cs typeface="+mn-cs"/>
+              </a:defRPr>
+            </a:lvl9pPr>
+          </a:lstStyle>
+          <a:p>
+            <a:r>
+              <a:rPr lang="de-DE" cap="none" dirty="0"/>
+              <a:t>Funktionstest Marketingelemente</a:t>
+            </a:r>
+          </a:p>
+          <a:p>
+            <a:pPr marL="285750" indent="-285750">
+              <a:buFont typeface="Wingdings" pitchFamily="2" charset="2"/>
+              <a:buChar char="è"/>
+            </a:pPr>
+            <a:endParaRPr lang="de-DE" cap="none" dirty="0"/>
+          </a:p>
+        </p:txBody>
+      </p:sp>
     </p:spTree>
     <p:extLst>
       <p:ext uri="{BB962C8B-B14F-4D97-AF65-F5344CB8AC3E}">
@@ -14139,14 +14922,275 @@
         </p:blipFill>
         <p:spPr>
           <a:xfrm>
-            <a:off x="1179339" y="1879106"/>
-            <a:ext cx="7482989" cy="4232854"/>
+            <a:off x="1179340" y="2173824"/>
+            <a:ext cx="6961974" cy="3938135"/>
           </a:xfrm>
           <a:prstGeom prst="rect">
             <a:avLst/>
           </a:prstGeom>
         </p:spPr>
       </p:pic>
+      <p:sp>
+        <p:nvSpPr>
+          <p:cNvPr id="8" name="Untertitel 2">
+            <a:extLst>
+              <a:ext uri="{FF2B5EF4-FFF2-40B4-BE49-F238E27FC236}">
+                <a16:creationId xmlns:a16="http://schemas.microsoft.com/office/drawing/2014/main" id="{C527FAF2-EB44-26C7-22DC-1EBAE3AE476F}"/>
+              </a:ext>
+            </a:extLst>
+          </p:cNvPr>
+          <p:cNvSpPr txBox="1">
+            <a:spLocks/>
+          </p:cNvSpPr>
+          <p:nvPr/>
+        </p:nvSpPr>
+        <p:spPr bwMode="gray">
+          <a:xfrm>
+            <a:off x="1179339" y="1688172"/>
+            <a:ext cx="8825658" cy="563880"/>
+          </a:xfrm>
+          <a:prstGeom prst="rect">
+            <a:avLst/>
+          </a:prstGeom>
+        </p:spPr>
+        <p:txBody>
+          <a:bodyPr vert="horz" lIns="91440" tIns="45720" rIns="91440" bIns="45720" rtlCol="0" anchor="t">
+            <a:normAutofit/>
+          </a:bodyPr>
+          <a:lstStyle>
+            <a:lvl1pPr marL="0" indent="0" algn="l" defTabSz="457200" rtl="0" eaLnBrk="1" latinLnBrk="0" hangingPunct="1">
+              <a:spcBef>
+                <a:spcPts val="1000"/>
+              </a:spcBef>
+              <a:spcAft>
+                <a:spcPts val="0"/>
+              </a:spcAft>
+              <a:buClr>
+                <a:schemeClr val="accent1"/>
+              </a:buClr>
+              <a:buSzPct val="80000"/>
+              <a:buFont typeface="Wingdings 3" charset="2"/>
+              <a:buNone/>
+              <a:defRPr sz="1800" b="0" i="0" kern="1200" cap="all">
+                <a:solidFill>
+                  <a:schemeClr val="accent1">
+                    <a:lumMod val="60000"/>
+                    <a:lumOff val="40000"/>
+                  </a:schemeClr>
+                </a:solidFill>
+                <a:latin typeface="+mn-lt"/>
+                <a:ea typeface="+mn-ea"/>
+                <a:cs typeface="+mn-cs"/>
+              </a:defRPr>
+            </a:lvl1pPr>
+            <a:lvl2pPr marL="457200" indent="0" algn="ctr" defTabSz="457200" rtl="0" eaLnBrk="1" latinLnBrk="0" hangingPunct="1">
+              <a:spcBef>
+                <a:spcPts val="1000"/>
+              </a:spcBef>
+              <a:spcAft>
+                <a:spcPts val="0"/>
+              </a:spcAft>
+              <a:buClr>
+                <a:schemeClr val="accent1"/>
+              </a:buClr>
+              <a:buSzPct val="80000"/>
+              <a:buFont typeface="Wingdings 3" charset="2"/>
+              <a:buNone/>
+              <a:defRPr sz="1600" b="0" i="0" kern="1200">
+                <a:solidFill>
+                  <a:schemeClr val="tx1">
+                    <a:tint val="75000"/>
+                  </a:schemeClr>
+                </a:solidFill>
+                <a:latin typeface="+mn-lt"/>
+                <a:ea typeface="+mn-ea"/>
+                <a:cs typeface="+mn-cs"/>
+              </a:defRPr>
+            </a:lvl2pPr>
+            <a:lvl3pPr marL="914400" indent="0" algn="ctr" defTabSz="457200" rtl="0" eaLnBrk="1" latinLnBrk="0" hangingPunct="1">
+              <a:spcBef>
+                <a:spcPts val="1000"/>
+              </a:spcBef>
+              <a:spcAft>
+                <a:spcPts val="0"/>
+              </a:spcAft>
+              <a:buClr>
+                <a:schemeClr val="accent1"/>
+              </a:buClr>
+              <a:buSzPct val="80000"/>
+              <a:buFont typeface="Wingdings 3" charset="2"/>
+              <a:buNone/>
+              <a:defRPr sz="1400" b="0" i="0" kern="1200">
+                <a:solidFill>
+                  <a:schemeClr val="tx1">
+                    <a:tint val="75000"/>
+                  </a:schemeClr>
+                </a:solidFill>
+                <a:latin typeface="+mn-lt"/>
+                <a:ea typeface="+mn-ea"/>
+                <a:cs typeface="+mn-cs"/>
+              </a:defRPr>
+            </a:lvl3pPr>
+            <a:lvl4pPr marL="1371600" indent="0" algn="ctr" defTabSz="457200" rtl="0" eaLnBrk="1" latinLnBrk="0" hangingPunct="1">
+              <a:spcBef>
+                <a:spcPts val="1000"/>
+              </a:spcBef>
+              <a:spcAft>
+                <a:spcPts val="0"/>
+              </a:spcAft>
+              <a:buClr>
+                <a:schemeClr val="accent1"/>
+              </a:buClr>
+              <a:buSzPct val="80000"/>
+              <a:buFont typeface="Wingdings 3" charset="2"/>
+              <a:buNone/>
+              <a:defRPr sz="1200" b="0" i="0" kern="1200">
+                <a:solidFill>
+                  <a:schemeClr val="tx1">
+                    <a:tint val="75000"/>
+                  </a:schemeClr>
+                </a:solidFill>
+                <a:latin typeface="+mn-lt"/>
+                <a:ea typeface="+mn-ea"/>
+                <a:cs typeface="+mn-cs"/>
+              </a:defRPr>
+            </a:lvl4pPr>
+            <a:lvl5pPr marL="1828800" indent="0" algn="ctr" defTabSz="457200" rtl="0" eaLnBrk="1" latinLnBrk="0" hangingPunct="1">
+              <a:spcBef>
+                <a:spcPts val="1000"/>
+              </a:spcBef>
+              <a:spcAft>
+                <a:spcPts val="0"/>
+              </a:spcAft>
+              <a:buClr>
+                <a:schemeClr val="accent1"/>
+              </a:buClr>
+              <a:buSzPct val="80000"/>
+              <a:buFont typeface="Wingdings 3" charset="2"/>
+              <a:buNone/>
+              <a:defRPr sz="1200" b="0" i="0" kern="1200">
+                <a:solidFill>
+                  <a:schemeClr val="tx1">
+                    <a:tint val="75000"/>
+                  </a:schemeClr>
+                </a:solidFill>
+                <a:latin typeface="+mn-lt"/>
+                <a:ea typeface="+mn-ea"/>
+                <a:cs typeface="+mn-cs"/>
+              </a:defRPr>
+            </a:lvl5pPr>
+            <a:lvl6pPr marL="2286000" indent="0" algn="ctr" defTabSz="457200" rtl="0" eaLnBrk="1" latinLnBrk="0" hangingPunct="1">
+              <a:spcBef>
+                <a:spcPts val="1000"/>
+              </a:spcBef>
+              <a:spcAft>
+                <a:spcPts val="0"/>
+              </a:spcAft>
+              <a:buClr>
+                <a:schemeClr val="accent1"/>
+              </a:buClr>
+              <a:buSzPct val="80000"/>
+              <a:buFont typeface="Wingdings 3" charset="2"/>
+              <a:buNone/>
+              <a:defRPr sz="1200" b="0" i="0" kern="1200">
+                <a:solidFill>
+                  <a:schemeClr val="tx1">
+                    <a:tint val="75000"/>
+                  </a:schemeClr>
+                </a:solidFill>
+                <a:latin typeface="+mn-lt"/>
+                <a:ea typeface="+mn-ea"/>
+                <a:cs typeface="+mn-cs"/>
+              </a:defRPr>
+            </a:lvl6pPr>
+            <a:lvl7pPr marL="2743200" indent="0" algn="ctr" defTabSz="457200" rtl="0" eaLnBrk="1" latinLnBrk="0" hangingPunct="1">
+              <a:spcBef>
+                <a:spcPts val="1000"/>
+              </a:spcBef>
+              <a:spcAft>
+                <a:spcPts val="0"/>
+              </a:spcAft>
+              <a:buClr>
+                <a:schemeClr val="accent1"/>
+              </a:buClr>
+              <a:buSzPct val="80000"/>
+              <a:buFont typeface="Wingdings 3" charset="2"/>
+              <a:buNone/>
+              <a:defRPr sz="1200" b="0" i="0" kern="1200">
+                <a:solidFill>
+                  <a:schemeClr val="tx1">
+                    <a:tint val="75000"/>
+                  </a:schemeClr>
+                </a:solidFill>
+                <a:latin typeface="+mn-lt"/>
+                <a:ea typeface="+mn-ea"/>
+                <a:cs typeface="+mn-cs"/>
+              </a:defRPr>
+            </a:lvl7pPr>
+            <a:lvl8pPr marL="3200400" indent="0" algn="ctr" defTabSz="457200" rtl="0" eaLnBrk="1" latinLnBrk="0" hangingPunct="1">
+              <a:spcBef>
+                <a:spcPts val="1000"/>
+              </a:spcBef>
+              <a:spcAft>
+                <a:spcPts val="0"/>
+              </a:spcAft>
+              <a:buClr>
+                <a:schemeClr val="accent1"/>
+              </a:buClr>
+              <a:buSzPct val="80000"/>
+              <a:buFont typeface="Wingdings 3" charset="2"/>
+              <a:buNone/>
+              <a:defRPr sz="1200" b="0" i="0" kern="1200">
+                <a:solidFill>
+                  <a:schemeClr val="tx1">
+                    <a:tint val="75000"/>
+                  </a:schemeClr>
+                </a:solidFill>
+                <a:latin typeface="+mn-lt"/>
+                <a:ea typeface="+mn-ea"/>
+                <a:cs typeface="+mn-cs"/>
+              </a:defRPr>
+            </a:lvl8pPr>
+            <a:lvl9pPr marL="3657600" indent="0" algn="ctr" defTabSz="457200" rtl="0" eaLnBrk="1" latinLnBrk="0" hangingPunct="1">
+              <a:spcBef>
+                <a:spcPts val="1000"/>
+              </a:spcBef>
+              <a:spcAft>
+                <a:spcPts val="0"/>
+              </a:spcAft>
+              <a:buClr>
+                <a:schemeClr val="accent1"/>
+              </a:buClr>
+              <a:buSzPct val="80000"/>
+              <a:buFont typeface="Wingdings 3" charset="2"/>
+              <a:buNone/>
+              <a:defRPr sz="1200" b="0" i="0" kern="1200">
+                <a:solidFill>
+                  <a:schemeClr val="tx1">
+                    <a:tint val="75000"/>
+                  </a:schemeClr>
+                </a:solidFill>
+                <a:latin typeface="+mn-lt"/>
+                <a:ea typeface="+mn-ea"/>
+                <a:cs typeface="+mn-cs"/>
+              </a:defRPr>
+            </a:lvl9pPr>
+          </a:lstStyle>
+          <a:p>
+            <a:r>
+              <a:rPr lang="de-DE" cap="none" dirty="0"/>
+              <a:t>Funktionstest Struktur und Seitenaufbau</a:t>
+            </a:r>
+          </a:p>
+          <a:p>
+            <a:pPr marL="285750" indent="-285750">
+              <a:buFont typeface="Wingdings" pitchFamily="2" charset="2"/>
+              <a:buChar char="è"/>
+            </a:pPr>
+            <a:endParaRPr lang="de-DE" cap="none" dirty="0"/>
+          </a:p>
+        </p:txBody>
+      </p:sp>
     </p:spTree>
     <p:extLst>
       <p:ext uri="{BB962C8B-B14F-4D97-AF65-F5344CB8AC3E}">
@@ -14284,14 +15328,282 @@
         </p:blipFill>
         <p:spPr>
           <a:xfrm>
-            <a:off x="1179339" y="1849499"/>
-            <a:ext cx="10123955" cy="4123789"/>
+            <a:off x="1179340" y="2246127"/>
+            <a:ext cx="9150228" cy="3727161"/>
           </a:xfrm>
           <a:prstGeom prst="rect">
             <a:avLst/>
           </a:prstGeom>
         </p:spPr>
       </p:pic>
+      <p:sp>
+        <p:nvSpPr>
+          <p:cNvPr id="8" name="Untertitel 2">
+            <a:extLst>
+              <a:ext uri="{FF2B5EF4-FFF2-40B4-BE49-F238E27FC236}">
+                <a16:creationId xmlns:a16="http://schemas.microsoft.com/office/drawing/2014/main" id="{B9C912E9-BB42-B7F2-E717-136482029167}"/>
+              </a:ext>
+            </a:extLst>
+          </p:cNvPr>
+          <p:cNvSpPr txBox="1">
+            <a:spLocks/>
+          </p:cNvSpPr>
+          <p:nvPr/>
+        </p:nvSpPr>
+        <p:spPr bwMode="gray">
+          <a:xfrm>
+            <a:off x="1179339" y="1688172"/>
+            <a:ext cx="8825658" cy="563880"/>
+          </a:xfrm>
+          <a:prstGeom prst="rect">
+            <a:avLst/>
+          </a:prstGeom>
+        </p:spPr>
+        <p:txBody>
+          <a:bodyPr vert="horz" lIns="91440" tIns="45720" rIns="91440" bIns="45720" rtlCol="0" anchor="t">
+            <a:normAutofit/>
+          </a:bodyPr>
+          <a:lstStyle>
+            <a:lvl1pPr marL="0" indent="0" algn="l" defTabSz="457200" rtl="0" eaLnBrk="1" latinLnBrk="0" hangingPunct="1">
+              <a:spcBef>
+                <a:spcPts val="1000"/>
+              </a:spcBef>
+              <a:spcAft>
+                <a:spcPts val="0"/>
+              </a:spcAft>
+              <a:buClr>
+                <a:schemeClr val="accent1"/>
+              </a:buClr>
+              <a:buSzPct val="80000"/>
+              <a:buFont typeface="Wingdings 3" charset="2"/>
+              <a:buNone/>
+              <a:defRPr sz="1800" b="0" i="0" kern="1200" cap="all">
+                <a:solidFill>
+                  <a:schemeClr val="accent1">
+                    <a:lumMod val="60000"/>
+                    <a:lumOff val="40000"/>
+                  </a:schemeClr>
+                </a:solidFill>
+                <a:latin typeface="+mn-lt"/>
+                <a:ea typeface="+mn-ea"/>
+                <a:cs typeface="+mn-cs"/>
+              </a:defRPr>
+            </a:lvl1pPr>
+            <a:lvl2pPr marL="457200" indent="0" algn="ctr" defTabSz="457200" rtl="0" eaLnBrk="1" latinLnBrk="0" hangingPunct="1">
+              <a:spcBef>
+                <a:spcPts val="1000"/>
+              </a:spcBef>
+              <a:spcAft>
+                <a:spcPts val="0"/>
+              </a:spcAft>
+              <a:buClr>
+                <a:schemeClr val="accent1"/>
+              </a:buClr>
+              <a:buSzPct val="80000"/>
+              <a:buFont typeface="Wingdings 3" charset="2"/>
+              <a:buNone/>
+              <a:defRPr sz="1600" b="0" i="0" kern="1200">
+                <a:solidFill>
+                  <a:schemeClr val="tx1">
+                    <a:tint val="75000"/>
+                  </a:schemeClr>
+                </a:solidFill>
+                <a:latin typeface="+mn-lt"/>
+                <a:ea typeface="+mn-ea"/>
+                <a:cs typeface="+mn-cs"/>
+              </a:defRPr>
+            </a:lvl2pPr>
+            <a:lvl3pPr marL="914400" indent="0" algn="ctr" defTabSz="457200" rtl="0" eaLnBrk="1" latinLnBrk="0" hangingPunct="1">
+              <a:spcBef>
+                <a:spcPts val="1000"/>
+              </a:spcBef>
+              <a:spcAft>
+                <a:spcPts val="0"/>
+              </a:spcAft>
+              <a:buClr>
+                <a:schemeClr val="accent1"/>
+              </a:buClr>
+              <a:buSzPct val="80000"/>
+              <a:buFont typeface="Wingdings 3" charset="2"/>
+              <a:buNone/>
+              <a:defRPr sz="1400" b="0" i="0" kern="1200">
+                <a:solidFill>
+                  <a:schemeClr val="tx1">
+                    <a:tint val="75000"/>
+                  </a:schemeClr>
+                </a:solidFill>
+                <a:latin typeface="+mn-lt"/>
+                <a:ea typeface="+mn-ea"/>
+                <a:cs typeface="+mn-cs"/>
+              </a:defRPr>
+            </a:lvl3pPr>
+            <a:lvl4pPr marL="1371600" indent="0" algn="ctr" defTabSz="457200" rtl="0" eaLnBrk="1" latinLnBrk="0" hangingPunct="1">
+              <a:spcBef>
+                <a:spcPts val="1000"/>
+              </a:spcBef>
+              <a:spcAft>
+                <a:spcPts val="0"/>
+              </a:spcAft>
+              <a:buClr>
+                <a:schemeClr val="accent1"/>
+              </a:buClr>
+              <a:buSzPct val="80000"/>
+              <a:buFont typeface="Wingdings 3" charset="2"/>
+              <a:buNone/>
+              <a:defRPr sz="1200" b="0" i="0" kern="1200">
+                <a:solidFill>
+                  <a:schemeClr val="tx1">
+                    <a:tint val="75000"/>
+                  </a:schemeClr>
+                </a:solidFill>
+                <a:latin typeface="+mn-lt"/>
+                <a:ea typeface="+mn-ea"/>
+                <a:cs typeface="+mn-cs"/>
+              </a:defRPr>
+            </a:lvl4pPr>
+            <a:lvl5pPr marL="1828800" indent="0" algn="ctr" defTabSz="457200" rtl="0" eaLnBrk="1" latinLnBrk="0" hangingPunct="1">
+              <a:spcBef>
+                <a:spcPts val="1000"/>
+              </a:spcBef>
+              <a:spcAft>
+                <a:spcPts val="0"/>
+              </a:spcAft>
+              <a:buClr>
+                <a:schemeClr val="accent1"/>
+              </a:buClr>
+              <a:buSzPct val="80000"/>
+              <a:buFont typeface="Wingdings 3" charset="2"/>
+              <a:buNone/>
+              <a:defRPr sz="1200" b="0" i="0" kern="1200">
+                <a:solidFill>
+                  <a:schemeClr val="tx1">
+                    <a:tint val="75000"/>
+                  </a:schemeClr>
+                </a:solidFill>
+                <a:latin typeface="+mn-lt"/>
+                <a:ea typeface="+mn-ea"/>
+                <a:cs typeface="+mn-cs"/>
+              </a:defRPr>
+            </a:lvl5pPr>
+            <a:lvl6pPr marL="2286000" indent="0" algn="ctr" defTabSz="457200" rtl="0" eaLnBrk="1" latinLnBrk="0" hangingPunct="1">
+              <a:spcBef>
+                <a:spcPts val="1000"/>
+              </a:spcBef>
+              <a:spcAft>
+                <a:spcPts val="0"/>
+              </a:spcAft>
+              <a:buClr>
+                <a:schemeClr val="accent1"/>
+              </a:buClr>
+              <a:buSzPct val="80000"/>
+              <a:buFont typeface="Wingdings 3" charset="2"/>
+              <a:buNone/>
+              <a:defRPr sz="1200" b="0" i="0" kern="1200">
+                <a:solidFill>
+                  <a:schemeClr val="tx1">
+                    <a:tint val="75000"/>
+                  </a:schemeClr>
+                </a:solidFill>
+                <a:latin typeface="+mn-lt"/>
+                <a:ea typeface="+mn-ea"/>
+                <a:cs typeface="+mn-cs"/>
+              </a:defRPr>
+            </a:lvl6pPr>
+            <a:lvl7pPr marL="2743200" indent="0" algn="ctr" defTabSz="457200" rtl="0" eaLnBrk="1" latinLnBrk="0" hangingPunct="1">
+              <a:spcBef>
+                <a:spcPts val="1000"/>
+              </a:spcBef>
+              <a:spcAft>
+                <a:spcPts val="0"/>
+              </a:spcAft>
+              <a:buClr>
+                <a:schemeClr val="accent1"/>
+              </a:buClr>
+              <a:buSzPct val="80000"/>
+              <a:buFont typeface="Wingdings 3" charset="2"/>
+              <a:buNone/>
+              <a:defRPr sz="1200" b="0" i="0" kern="1200">
+                <a:solidFill>
+                  <a:schemeClr val="tx1">
+                    <a:tint val="75000"/>
+                  </a:schemeClr>
+                </a:solidFill>
+                <a:latin typeface="+mn-lt"/>
+                <a:ea typeface="+mn-ea"/>
+                <a:cs typeface="+mn-cs"/>
+              </a:defRPr>
+            </a:lvl7pPr>
+            <a:lvl8pPr marL="3200400" indent="0" algn="ctr" defTabSz="457200" rtl="0" eaLnBrk="1" latinLnBrk="0" hangingPunct="1">
+              <a:spcBef>
+                <a:spcPts val="1000"/>
+              </a:spcBef>
+              <a:spcAft>
+                <a:spcPts val="0"/>
+              </a:spcAft>
+              <a:buClr>
+                <a:schemeClr val="accent1"/>
+              </a:buClr>
+              <a:buSzPct val="80000"/>
+              <a:buFont typeface="Wingdings 3" charset="2"/>
+              <a:buNone/>
+              <a:defRPr sz="1200" b="0" i="0" kern="1200">
+                <a:solidFill>
+                  <a:schemeClr val="tx1">
+                    <a:tint val="75000"/>
+                  </a:schemeClr>
+                </a:solidFill>
+                <a:latin typeface="+mn-lt"/>
+                <a:ea typeface="+mn-ea"/>
+                <a:cs typeface="+mn-cs"/>
+              </a:defRPr>
+            </a:lvl8pPr>
+            <a:lvl9pPr marL="3657600" indent="0" algn="ctr" defTabSz="457200" rtl="0" eaLnBrk="1" latinLnBrk="0" hangingPunct="1">
+              <a:spcBef>
+                <a:spcPts val="1000"/>
+              </a:spcBef>
+              <a:spcAft>
+                <a:spcPts val="0"/>
+              </a:spcAft>
+              <a:buClr>
+                <a:schemeClr val="accent1"/>
+              </a:buClr>
+              <a:buSzPct val="80000"/>
+              <a:buFont typeface="Wingdings 3" charset="2"/>
+              <a:buNone/>
+              <a:defRPr sz="1200" b="0" i="0" kern="1200">
+                <a:solidFill>
+                  <a:schemeClr val="tx1">
+                    <a:tint val="75000"/>
+                  </a:schemeClr>
+                </a:solidFill>
+                <a:latin typeface="+mn-lt"/>
+                <a:ea typeface="+mn-ea"/>
+                <a:cs typeface="+mn-cs"/>
+              </a:defRPr>
+            </a:lvl9pPr>
+          </a:lstStyle>
+          <a:p>
+            <a:r>
+              <a:rPr lang="de-DE" cap="none" dirty="0"/>
+              <a:t>Final Touches </a:t>
+            </a:r>
+            <a:r>
+              <a:rPr lang="de-DE" cap="none" dirty="0">
+                <a:sym typeface="Wingdings" pitchFamily="2" charset="2"/>
+              </a:rPr>
+              <a:t> Endergebnis</a:t>
+            </a:r>
+            <a:endParaRPr lang="de-DE" cap="none" dirty="0"/>
+          </a:p>
+          <a:p>
+            <a:pPr marL="285750" indent="-285750">
+              <a:buFont typeface="Wingdings" pitchFamily="2" charset="2"/>
+              <a:buChar char="è"/>
+            </a:pPr>
+            <a:endParaRPr lang="de-DE" cap="none" dirty="0"/>
+          </a:p>
+        </p:txBody>
+      </p:sp>
     </p:spTree>
     <p:extLst>
       <p:ext uri="{BB962C8B-B14F-4D97-AF65-F5344CB8AC3E}">
@@ -14767,12 +16079,12 @@
           <a:lstStyle/>
           <a:p>
             <a:r>
-              <a:rPr lang="de-DE">
+              <a:rPr lang="de-DE" dirty="0">
                 <a:solidFill>
                   <a:srgbClr val="EBEBEB"/>
                 </a:solidFill>
               </a:rPr>
-              <a:t>Thank you</a:t>
+              <a:t>Vielen Dank</a:t>
             </a:r>
           </a:p>
         </p:txBody>
@@ -16501,8 +17813,8 @@
         </p:blipFill>
         <p:spPr>
           <a:xfrm>
-            <a:off x="451262" y="439388"/>
-            <a:ext cx="11260091" cy="5964898"/>
+            <a:off x="451262" y="466658"/>
+            <a:ext cx="11260091" cy="5937627"/>
           </a:xfrm>
           <a:prstGeom prst="rect">
             <a:avLst/>
@@ -16815,6 +18127,267 @@
           </a:prstGeom>
         </p:spPr>
       </p:pic>
+      <p:sp>
+        <p:nvSpPr>
+          <p:cNvPr id="22" name="Untertitel 2">
+            <a:extLst>
+              <a:ext uri="{FF2B5EF4-FFF2-40B4-BE49-F238E27FC236}">
+                <a16:creationId xmlns:a16="http://schemas.microsoft.com/office/drawing/2014/main" id="{B0A168A8-F702-108C-CD65-A048EDA4E3BF}"/>
+              </a:ext>
+            </a:extLst>
+          </p:cNvPr>
+          <p:cNvSpPr txBox="1">
+            <a:spLocks/>
+          </p:cNvSpPr>
+          <p:nvPr/>
+        </p:nvSpPr>
+        <p:spPr bwMode="gray">
+          <a:xfrm>
+            <a:off x="1179339" y="1688172"/>
+            <a:ext cx="8825658" cy="563880"/>
+          </a:xfrm>
+          <a:prstGeom prst="rect">
+            <a:avLst/>
+          </a:prstGeom>
+        </p:spPr>
+        <p:txBody>
+          <a:bodyPr vert="horz" lIns="91440" tIns="45720" rIns="91440" bIns="45720" rtlCol="0" anchor="t">
+            <a:normAutofit/>
+          </a:bodyPr>
+          <a:lstStyle>
+            <a:lvl1pPr marL="0" indent="0" algn="l" defTabSz="457200" rtl="0" eaLnBrk="1" latinLnBrk="0" hangingPunct="1">
+              <a:spcBef>
+                <a:spcPts val="1000"/>
+              </a:spcBef>
+              <a:spcAft>
+                <a:spcPts val="0"/>
+              </a:spcAft>
+              <a:buClr>
+                <a:schemeClr val="accent1"/>
+              </a:buClr>
+              <a:buSzPct val="80000"/>
+              <a:buFont typeface="Wingdings 3" charset="2"/>
+              <a:buNone/>
+              <a:defRPr sz="1800" b="0" i="0" kern="1200" cap="all">
+                <a:solidFill>
+                  <a:schemeClr val="accent1">
+                    <a:lumMod val="60000"/>
+                    <a:lumOff val="40000"/>
+                  </a:schemeClr>
+                </a:solidFill>
+                <a:latin typeface="+mn-lt"/>
+                <a:ea typeface="+mn-ea"/>
+                <a:cs typeface="+mn-cs"/>
+              </a:defRPr>
+            </a:lvl1pPr>
+            <a:lvl2pPr marL="457200" indent="0" algn="ctr" defTabSz="457200" rtl="0" eaLnBrk="1" latinLnBrk="0" hangingPunct="1">
+              <a:spcBef>
+                <a:spcPts val="1000"/>
+              </a:spcBef>
+              <a:spcAft>
+                <a:spcPts val="0"/>
+              </a:spcAft>
+              <a:buClr>
+                <a:schemeClr val="accent1"/>
+              </a:buClr>
+              <a:buSzPct val="80000"/>
+              <a:buFont typeface="Wingdings 3" charset="2"/>
+              <a:buNone/>
+              <a:defRPr sz="1600" b="0" i="0" kern="1200">
+                <a:solidFill>
+                  <a:schemeClr val="tx1">
+                    <a:tint val="75000"/>
+                  </a:schemeClr>
+                </a:solidFill>
+                <a:latin typeface="+mn-lt"/>
+                <a:ea typeface="+mn-ea"/>
+                <a:cs typeface="+mn-cs"/>
+              </a:defRPr>
+            </a:lvl2pPr>
+            <a:lvl3pPr marL="914400" indent="0" algn="ctr" defTabSz="457200" rtl="0" eaLnBrk="1" latinLnBrk="0" hangingPunct="1">
+              <a:spcBef>
+                <a:spcPts val="1000"/>
+              </a:spcBef>
+              <a:spcAft>
+                <a:spcPts val="0"/>
+              </a:spcAft>
+              <a:buClr>
+                <a:schemeClr val="accent1"/>
+              </a:buClr>
+              <a:buSzPct val="80000"/>
+              <a:buFont typeface="Wingdings 3" charset="2"/>
+              <a:buNone/>
+              <a:defRPr sz="1400" b="0" i="0" kern="1200">
+                <a:solidFill>
+                  <a:schemeClr val="tx1">
+                    <a:tint val="75000"/>
+                  </a:schemeClr>
+                </a:solidFill>
+                <a:latin typeface="+mn-lt"/>
+                <a:ea typeface="+mn-ea"/>
+                <a:cs typeface="+mn-cs"/>
+              </a:defRPr>
+            </a:lvl3pPr>
+            <a:lvl4pPr marL="1371600" indent="0" algn="ctr" defTabSz="457200" rtl="0" eaLnBrk="1" latinLnBrk="0" hangingPunct="1">
+              <a:spcBef>
+                <a:spcPts val="1000"/>
+              </a:spcBef>
+              <a:spcAft>
+                <a:spcPts val="0"/>
+              </a:spcAft>
+              <a:buClr>
+                <a:schemeClr val="accent1"/>
+              </a:buClr>
+              <a:buSzPct val="80000"/>
+              <a:buFont typeface="Wingdings 3" charset="2"/>
+              <a:buNone/>
+              <a:defRPr sz="1200" b="0" i="0" kern="1200">
+                <a:solidFill>
+                  <a:schemeClr val="tx1">
+                    <a:tint val="75000"/>
+                  </a:schemeClr>
+                </a:solidFill>
+                <a:latin typeface="+mn-lt"/>
+                <a:ea typeface="+mn-ea"/>
+                <a:cs typeface="+mn-cs"/>
+              </a:defRPr>
+            </a:lvl4pPr>
+            <a:lvl5pPr marL="1828800" indent="0" algn="ctr" defTabSz="457200" rtl="0" eaLnBrk="1" latinLnBrk="0" hangingPunct="1">
+              <a:spcBef>
+                <a:spcPts val="1000"/>
+              </a:spcBef>
+              <a:spcAft>
+                <a:spcPts val="0"/>
+              </a:spcAft>
+              <a:buClr>
+                <a:schemeClr val="accent1"/>
+              </a:buClr>
+              <a:buSzPct val="80000"/>
+              <a:buFont typeface="Wingdings 3" charset="2"/>
+              <a:buNone/>
+              <a:defRPr sz="1200" b="0" i="0" kern="1200">
+                <a:solidFill>
+                  <a:schemeClr val="tx1">
+                    <a:tint val="75000"/>
+                  </a:schemeClr>
+                </a:solidFill>
+                <a:latin typeface="+mn-lt"/>
+                <a:ea typeface="+mn-ea"/>
+                <a:cs typeface="+mn-cs"/>
+              </a:defRPr>
+            </a:lvl5pPr>
+            <a:lvl6pPr marL="2286000" indent="0" algn="ctr" defTabSz="457200" rtl="0" eaLnBrk="1" latinLnBrk="0" hangingPunct="1">
+              <a:spcBef>
+                <a:spcPts val="1000"/>
+              </a:spcBef>
+              <a:spcAft>
+                <a:spcPts val="0"/>
+              </a:spcAft>
+              <a:buClr>
+                <a:schemeClr val="accent1"/>
+              </a:buClr>
+              <a:buSzPct val="80000"/>
+              <a:buFont typeface="Wingdings 3" charset="2"/>
+              <a:buNone/>
+              <a:defRPr sz="1200" b="0" i="0" kern="1200">
+                <a:solidFill>
+                  <a:schemeClr val="tx1">
+                    <a:tint val="75000"/>
+                  </a:schemeClr>
+                </a:solidFill>
+                <a:latin typeface="+mn-lt"/>
+                <a:ea typeface="+mn-ea"/>
+                <a:cs typeface="+mn-cs"/>
+              </a:defRPr>
+            </a:lvl6pPr>
+            <a:lvl7pPr marL="2743200" indent="0" algn="ctr" defTabSz="457200" rtl="0" eaLnBrk="1" latinLnBrk="0" hangingPunct="1">
+              <a:spcBef>
+                <a:spcPts val="1000"/>
+              </a:spcBef>
+              <a:spcAft>
+                <a:spcPts val="0"/>
+              </a:spcAft>
+              <a:buClr>
+                <a:schemeClr val="accent1"/>
+              </a:buClr>
+              <a:buSzPct val="80000"/>
+              <a:buFont typeface="Wingdings 3" charset="2"/>
+              <a:buNone/>
+              <a:defRPr sz="1200" b="0" i="0" kern="1200">
+                <a:solidFill>
+                  <a:schemeClr val="tx1">
+                    <a:tint val="75000"/>
+                  </a:schemeClr>
+                </a:solidFill>
+                <a:latin typeface="+mn-lt"/>
+                <a:ea typeface="+mn-ea"/>
+                <a:cs typeface="+mn-cs"/>
+              </a:defRPr>
+            </a:lvl7pPr>
+            <a:lvl8pPr marL="3200400" indent="0" algn="ctr" defTabSz="457200" rtl="0" eaLnBrk="1" latinLnBrk="0" hangingPunct="1">
+              <a:spcBef>
+                <a:spcPts val="1000"/>
+              </a:spcBef>
+              <a:spcAft>
+                <a:spcPts val="0"/>
+              </a:spcAft>
+              <a:buClr>
+                <a:schemeClr val="accent1"/>
+              </a:buClr>
+              <a:buSzPct val="80000"/>
+              <a:buFont typeface="Wingdings 3" charset="2"/>
+              <a:buNone/>
+              <a:defRPr sz="1200" b="0" i="0" kern="1200">
+                <a:solidFill>
+                  <a:schemeClr val="tx1">
+                    <a:tint val="75000"/>
+                  </a:schemeClr>
+                </a:solidFill>
+                <a:latin typeface="+mn-lt"/>
+                <a:ea typeface="+mn-ea"/>
+                <a:cs typeface="+mn-cs"/>
+              </a:defRPr>
+            </a:lvl8pPr>
+            <a:lvl9pPr marL="3657600" indent="0" algn="ctr" defTabSz="457200" rtl="0" eaLnBrk="1" latinLnBrk="0" hangingPunct="1">
+              <a:spcBef>
+                <a:spcPts val="1000"/>
+              </a:spcBef>
+              <a:spcAft>
+                <a:spcPts val="0"/>
+              </a:spcAft>
+              <a:buClr>
+                <a:schemeClr val="accent1"/>
+              </a:buClr>
+              <a:buSzPct val="80000"/>
+              <a:buFont typeface="Wingdings 3" charset="2"/>
+              <a:buNone/>
+              <a:defRPr sz="1200" b="0" i="0" kern="1200">
+                <a:solidFill>
+                  <a:schemeClr val="tx1">
+                    <a:tint val="75000"/>
+                  </a:schemeClr>
+                </a:solidFill>
+                <a:latin typeface="+mn-lt"/>
+                <a:ea typeface="+mn-ea"/>
+                <a:cs typeface="+mn-cs"/>
+              </a:defRPr>
+            </a:lvl9pPr>
+          </a:lstStyle>
+          <a:p>
+            <a:r>
+              <a:rPr lang="de-DE" cap="none" dirty="0"/>
+              <a:t>Funktionstest API</a:t>
+            </a:r>
+          </a:p>
+          <a:p>
+            <a:pPr marL="285750" indent="-285750">
+              <a:buFont typeface="Wingdings" pitchFamily="2" charset="2"/>
+              <a:buChar char="è"/>
+            </a:pPr>
+            <a:endParaRPr lang="de-DE" cap="none" dirty="0"/>
+          </a:p>
+        </p:txBody>
+      </p:sp>
     </p:spTree>
     <p:extLst>
       <p:ext uri="{BB962C8B-B14F-4D97-AF65-F5344CB8AC3E}">
@@ -16960,6 +18533,272 @@
           </a:prstGeom>
         </p:spPr>
       </p:pic>
+      <p:sp>
+        <p:nvSpPr>
+          <p:cNvPr id="7" name="Untertitel 2">
+            <a:extLst>
+              <a:ext uri="{FF2B5EF4-FFF2-40B4-BE49-F238E27FC236}">
+                <a16:creationId xmlns:a16="http://schemas.microsoft.com/office/drawing/2014/main" id="{0AF03D14-57D3-2549-F3E7-4E9AD1523C08}"/>
+              </a:ext>
+            </a:extLst>
+          </p:cNvPr>
+          <p:cNvSpPr txBox="1">
+            <a:spLocks/>
+          </p:cNvSpPr>
+          <p:nvPr/>
+        </p:nvSpPr>
+        <p:spPr bwMode="gray">
+          <a:xfrm>
+            <a:off x="1179339" y="1688172"/>
+            <a:ext cx="8825658" cy="563880"/>
+          </a:xfrm>
+          <a:prstGeom prst="rect">
+            <a:avLst/>
+          </a:prstGeom>
+        </p:spPr>
+        <p:txBody>
+          <a:bodyPr vert="horz" lIns="91440" tIns="45720" rIns="91440" bIns="45720" rtlCol="0" anchor="t">
+            <a:normAutofit/>
+          </a:bodyPr>
+          <a:lstStyle>
+            <a:lvl1pPr marL="0" indent="0" algn="l" defTabSz="457200" rtl="0" eaLnBrk="1" latinLnBrk="0" hangingPunct="1">
+              <a:spcBef>
+                <a:spcPts val="1000"/>
+              </a:spcBef>
+              <a:spcAft>
+                <a:spcPts val="0"/>
+              </a:spcAft>
+              <a:buClr>
+                <a:schemeClr val="accent1"/>
+              </a:buClr>
+              <a:buSzPct val="80000"/>
+              <a:buFont typeface="Wingdings 3" charset="2"/>
+              <a:buNone/>
+              <a:defRPr sz="1800" b="0" i="0" kern="1200" cap="all">
+                <a:solidFill>
+                  <a:schemeClr val="accent1">
+                    <a:lumMod val="60000"/>
+                    <a:lumOff val="40000"/>
+                  </a:schemeClr>
+                </a:solidFill>
+                <a:latin typeface="+mn-lt"/>
+                <a:ea typeface="+mn-ea"/>
+                <a:cs typeface="+mn-cs"/>
+              </a:defRPr>
+            </a:lvl1pPr>
+            <a:lvl2pPr marL="457200" indent="0" algn="ctr" defTabSz="457200" rtl="0" eaLnBrk="1" latinLnBrk="0" hangingPunct="1">
+              <a:spcBef>
+                <a:spcPts val="1000"/>
+              </a:spcBef>
+              <a:spcAft>
+                <a:spcPts val="0"/>
+              </a:spcAft>
+              <a:buClr>
+                <a:schemeClr val="accent1"/>
+              </a:buClr>
+              <a:buSzPct val="80000"/>
+              <a:buFont typeface="Wingdings 3" charset="2"/>
+              <a:buNone/>
+              <a:defRPr sz="1600" b="0" i="0" kern="1200">
+                <a:solidFill>
+                  <a:schemeClr val="tx1">
+                    <a:tint val="75000"/>
+                  </a:schemeClr>
+                </a:solidFill>
+                <a:latin typeface="+mn-lt"/>
+                <a:ea typeface="+mn-ea"/>
+                <a:cs typeface="+mn-cs"/>
+              </a:defRPr>
+            </a:lvl2pPr>
+            <a:lvl3pPr marL="914400" indent="0" algn="ctr" defTabSz="457200" rtl="0" eaLnBrk="1" latinLnBrk="0" hangingPunct="1">
+              <a:spcBef>
+                <a:spcPts val="1000"/>
+              </a:spcBef>
+              <a:spcAft>
+                <a:spcPts val="0"/>
+              </a:spcAft>
+              <a:buClr>
+                <a:schemeClr val="accent1"/>
+              </a:buClr>
+              <a:buSzPct val="80000"/>
+              <a:buFont typeface="Wingdings 3" charset="2"/>
+              <a:buNone/>
+              <a:defRPr sz="1400" b="0" i="0" kern="1200">
+                <a:solidFill>
+                  <a:schemeClr val="tx1">
+                    <a:tint val="75000"/>
+                  </a:schemeClr>
+                </a:solidFill>
+                <a:latin typeface="+mn-lt"/>
+                <a:ea typeface="+mn-ea"/>
+                <a:cs typeface="+mn-cs"/>
+              </a:defRPr>
+            </a:lvl3pPr>
+            <a:lvl4pPr marL="1371600" indent="0" algn="ctr" defTabSz="457200" rtl="0" eaLnBrk="1" latinLnBrk="0" hangingPunct="1">
+              <a:spcBef>
+                <a:spcPts val="1000"/>
+              </a:spcBef>
+              <a:spcAft>
+                <a:spcPts val="0"/>
+              </a:spcAft>
+              <a:buClr>
+                <a:schemeClr val="accent1"/>
+              </a:buClr>
+              <a:buSzPct val="80000"/>
+              <a:buFont typeface="Wingdings 3" charset="2"/>
+              <a:buNone/>
+              <a:defRPr sz="1200" b="0" i="0" kern="1200">
+                <a:solidFill>
+                  <a:schemeClr val="tx1">
+                    <a:tint val="75000"/>
+                  </a:schemeClr>
+                </a:solidFill>
+                <a:latin typeface="+mn-lt"/>
+                <a:ea typeface="+mn-ea"/>
+                <a:cs typeface="+mn-cs"/>
+              </a:defRPr>
+            </a:lvl4pPr>
+            <a:lvl5pPr marL="1828800" indent="0" algn="ctr" defTabSz="457200" rtl="0" eaLnBrk="1" latinLnBrk="0" hangingPunct="1">
+              <a:spcBef>
+                <a:spcPts val="1000"/>
+              </a:spcBef>
+              <a:spcAft>
+                <a:spcPts val="0"/>
+              </a:spcAft>
+              <a:buClr>
+                <a:schemeClr val="accent1"/>
+              </a:buClr>
+              <a:buSzPct val="80000"/>
+              <a:buFont typeface="Wingdings 3" charset="2"/>
+              <a:buNone/>
+              <a:defRPr sz="1200" b="0" i="0" kern="1200">
+                <a:solidFill>
+                  <a:schemeClr val="tx1">
+                    <a:tint val="75000"/>
+                  </a:schemeClr>
+                </a:solidFill>
+                <a:latin typeface="+mn-lt"/>
+                <a:ea typeface="+mn-ea"/>
+                <a:cs typeface="+mn-cs"/>
+              </a:defRPr>
+            </a:lvl5pPr>
+            <a:lvl6pPr marL="2286000" indent="0" algn="ctr" defTabSz="457200" rtl="0" eaLnBrk="1" latinLnBrk="0" hangingPunct="1">
+              <a:spcBef>
+                <a:spcPts val="1000"/>
+              </a:spcBef>
+              <a:spcAft>
+                <a:spcPts val="0"/>
+              </a:spcAft>
+              <a:buClr>
+                <a:schemeClr val="accent1"/>
+              </a:buClr>
+              <a:buSzPct val="80000"/>
+              <a:buFont typeface="Wingdings 3" charset="2"/>
+              <a:buNone/>
+              <a:defRPr sz="1200" b="0" i="0" kern="1200">
+                <a:solidFill>
+                  <a:schemeClr val="tx1">
+                    <a:tint val="75000"/>
+                  </a:schemeClr>
+                </a:solidFill>
+                <a:latin typeface="+mn-lt"/>
+                <a:ea typeface="+mn-ea"/>
+                <a:cs typeface="+mn-cs"/>
+              </a:defRPr>
+            </a:lvl6pPr>
+            <a:lvl7pPr marL="2743200" indent="0" algn="ctr" defTabSz="457200" rtl="0" eaLnBrk="1" latinLnBrk="0" hangingPunct="1">
+              <a:spcBef>
+                <a:spcPts val="1000"/>
+              </a:spcBef>
+              <a:spcAft>
+                <a:spcPts val="0"/>
+              </a:spcAft>
+              <a:buClr>
+                <a:schemeClr val="accent1"/>
+              </a:buClr>
+              <a:buSzPct val="80000"/>
+              <a:buFont typeface="Wingdings 3" charset="2"/>
+              <a:buNone/>
+              <a:defRPr sz="1200" b="0" i="0" kern="1200">
+                <a:solidFill>
+                  <a:schemeClr val="tx1">
+                    <a:tint val="75000"/>
+                  </a:schemeClr>
+                </a:solidFill>
+                <a:latin typeface="+mn-lt"/>
+                <a:ea typeface="+mn-ea"/>
+                <a:cs typeface="+mn-cs"/>
+              </a:defRPr>
+            </a:lvl7pPr>
+            <a:lvl8pPr marL="3200400" indent="0" algn="ctr" defTabSz="457200" rtl="0" eaLnBrk="1" latinLnBrk="0" hangingPunct="1">
+              <a:spcBef>
+                <a:spcPts val="1000"/>
+              </a:spcBef>
+              <a:spcAft>
+                <a:spcPts val="0"/>
+              </a:spcAft>
+              <a:buClr>
+                <a:schemeClr val="accent1"/>
+              </a:buClr>
+              <a:buSzPct val="80000"/>
+              <a:buFont typeface="Wingdings 3" charset="2"/>
+              <a:buNone/>
+              <a:defRPr sz="1200" b="0" i="0" kern="1200">
+                <a:solidFill>
+                  <a:schemeClr val="tx1">
+                    <a:tint val="75000"/>
+                  </a:schemeClr>
+                </a:solidFill>
+                <a:latin typeface="+mn-lt"/>
+                <a:ea typeface="+mn-ea"/>
+                <a:cs typeface="+mn-cs"/>
+              </a:defRPr>
+            </a:lvl8pPr>
+            <a:lvl9pPr marL="3657600" indent="0" algn="ctr" defTabSz="457200" rtl="0" eaLnBrk="1" latinLnBrk="0" hangingPunct="1">
+              <a:spcBef>
+                <a:spcPts val="1000"/>
+              </a:spcBef>
+              <a:spcAft>
+                <a:spcPts val="0"/>
+              </a:spcAft>
+              <a:buClr>
+                <a:schemeClr val="accent1"/>
+              </a:buClr>
+              <a:buSzPct val="80000"/>
+              <a:buFont typeface="Wingdings 3" charset="2"/>
+              <a:buNone/>
+              <a:defRPr sz="1200" b="0" i="0" kern="1200">
+                <a:solidFill>
+                  <a:schemeClr val="tx1">
+                    <a:tint val="75000"/>
+                  </a:schemeClr>
+                </a:solidFill>
+                <a:latin typeface="+mn-lt"/>
+                <a:ea typeface="+mn-ea"/>
+                <a:cs typeface="+mn-cs"/>
+              </a:defRPr>
+            </a:lvl9pPr>
+          </a:lstStyle>
+          <a:p>
+            <a:r>
+              <a:rPr lang="de-DE" cap="none" dirty="0"/>
+              <a:t>Funktionstest </a:t>
+            </a:r>
+            <a:r>
+              <a:rPr lang="de-DE" cap="none" dirty="0" err="1"/>
+              <a:t>chalk</a:t>
+            </a:r>
+            <a:endParaRPr lang="de-DE" cap="none" dirty="0"/>
+          </a:p>
+          <a:p>
+            <a:pPr marL="285750" indent="-285750">
+              <a:buFont typeface="Wingdings" pitchFamily="2" charset="2"/>
+              <a:buChar char="è"/>
+            </a:pPr>
+            <a:endParaRPr lang="de-DE" cap="none" dirty="0"/>
+          </a:p>
+        </p:txBody>
+      </p:sp>
     </p:spTree>
     <p:extLst>
       <p:ext uri="{BB962C8B-B14F-4D97-AF65-F5344CB8AC3E}">
@@ -17105,6 +18944,272 @@
           </a:prstGeom>
         </p:spPr>
       </p:pic>
+      <p:sp>
+        <p:nvSpPr>
+          <p:cNvPr id="7" name="Untertitel 2">
+            <a:extLst>
+              <a:ext uri="{FF2B5EF4-FFF2-40B4-BE49-F238E27FC236}">
+                <a16:creationId xmlns:a16="http://schemas.microsoft.com/office/drawing/2014/main" id="{EE842B91-0DB4-7D5C-B6E2-4D0E96127047}"/>
+              </a:ext>
+            </a:extLst>
+          </p:cNvPr>
+          <p:cNvSpPr txBox="1">
+            <a:spLocks/>
+          </p:cNvSpPr>
+          <p:nvPr/>
+        </p:nvSpPr>
+        <p:spPr bwMode="gray">
+          <a:xfrm>
+            <a:off x="1179339" y="1688172"/>
+            <a:ext cx="8825658" cy="563880"/>
+          </a:xfrm>
+          <a:prstGeom prst="rect">
+            <a:avLst/>
+          </a:prstGeom>
+        </p:spPr>
+        <p:txBody>
+          <a:bodyPr vert="horz" lIns="91440" tIns="45720" rIns="91440" bIns="45720" rtlCol="0" anchor="t">
+            <a:normAutofit/>
+          </a:bodyPr>
+          <a:lstStyle>
+            <a:lvl1pPr marL="0" indent="0" algn="l" defTabSz="457200" rtl="0" eaLnBrk="1" latinLnBrk="0" hangingPunct="1">
+              <a:spcBef>
+                <a:spcPts val="1000"/>
+              </a:spcBef>
+              <a:spcAft>
+                <a:spcPts val="0"/>
+              </a:spcAft>
+              <a:buClr>
+                <a:schemeClr val="accent1"/>
+              </a:buClr>
+              <a:buSzPct val="80000"/>
+              <a:buFont typeface="Wingdings 3" charset="2"/>
+              <a:buNone/>
+              <a:defRPr sz="1800" b="0" i="0" kern="1200" cap="all">
+                <a:solidFill>
+                  <a:schemeClr val="accent1">
+                    <a:lumMod val="60000"/>
+                    <a:lumOff val="40000"/>
+                  </a:schemeClr>
+                </a:solidFill>
+                <a:latin typeface="+mn-lt"/>
+                <a:ea typeface="+mn-ea"/>
+                <a:cs typeface="+mn-cs"/>
+              </a:defRPr>
+            </a:lvl1pPr>
+            <a:lvl2pPr marL="457200" indent="0" algn="ctr" defTabSz="457200" rtl="0" eaLnBrk="1" latinLnBrk="0" hangingPunct="1">
+              <a:spcBef>
+                <a:spcPts val="1000"/>
+              </a:spcBef>
+              <a:spcAft>
+                <a:spcPts val="0"/>
+              </a:spcAft>
+              <a:buClr>
+                <a:schemeClr val="accent1"/>
+              </a:buClr>
+              <a:buSzPct val="80000"/>
+              <a:buFont typeface="Wingdings 3" charset="2"/>
+              <a:buNone/>
+              <a:defRPr sz="1600" b="0" i="0" kern="1200">
+                <a:solidFill>
+                  <a:schemeClr val="tx1">
+                    <a:tint val="75000"/>
+                  </a:schemeClr>
+                </a:solidFill>
+                <a:latin typeface="+mn-lt"/>
+                <a:ea typeface="+mn-ea"/>
+                <a:cs typeface="+mn-cs"/>
+              </a:defRPr>
+            </a:lvl2pPr>
+            <a:lvl3pPr marL="914400" indent="0" algn="ctr" defTabSz="457200" rtl="0" eaLnBrk="1" latinLnBrk="0" hangingPunct="1">
+              <a:spcBef>
+                <a:spcPts val="1000"/>
+              </a:spcBef>
+              <a:spcAft>
+                <a:spcPts val="0"/>
+              </a:spcAft>
+              <a:buClr>
+                <a:schemeClr val="accent1"/>
+              </a:buClr>
+              <a:buSzPct val="80000"/>
+              <a:buFont typeface="Wingdings 3" charset="2"/>
+              <a:buNone/>
+              <a:defRPr sz="1400" b="0" i="0" kern="1200">
+                <a:solidFill>
+                  <a:schemeClr val="tx1">
+                    <a:tint val="75000"/>
+                  </a:schemeClr>
+                </a:solidFill>
+                <a:latin typeface="+mn-lt"/>
+                <a:ea typeface="+mn-ea"/>
+                <a:cs typeface="+mn-cs"/>
+              </a:defRPr>
+            </a:lvl3pPr>
+            <a:lvl4pPr marL="1371600" indent="0" algn="ctr" defTabSz="457200" rtl="0" eaLnBrk="1" latinLnBrk="0" hangingPunct="1">
+              <a:spcBef>
+                <a:spcPts val="1000"/>
+              </a:spcBef>
+              <a:spcAft>
+                <a:spcPts val="0"/>
+              </a:spcAft>
+              <a:buClr>
+                <a:schemeClr val="accent1"/>
+              </a:buClr>
+              <a:buSzPct val="80000"/>
+              <a:buFont typeface="Wingdings 3" charset="2"/>
+              <a:buNone/>
+              <a:defRPr sz="1200" b="0" i="0" kern="1200">
+                <a:solidFill>
+                  <a:schemeClr val="tx1">
+                    <a:tint val="75000"/>
+                  </a:schemeClr>
+                </a:solidFill>
+                <a:latin typeface="+mn-lt"/>
+                <a:ea typeface="+mn-ea"/>
+                <a:cs typeface="+mn-cs"/>
+              </a:defRPr>
+            </a:lvl4pPr>
+            <a:lvl5pPr marL="1828800" indent="0" algn="ctr" defTabSz="457200" rtl="0" eaLnBrk="1" latinLnBrk="0" hangingPunct="1">
+              <a:spcBef>
+                <a:spcPts val="1000"/>
+              </a:spcBef>
+              <a:spcAft>
+                <a:spcPts val="0"/>
+              </a:spcAft>
+              <a:buClr>
+                <a:schemeClr val="accent1"/>
+              </a:buClr>
+              <a:buSzPct val="80000"/>
+              <a:buFont typeface="Wingdings 3" charset="2"/>
+              <a:buNone/>
+              <a:defRPr sz="1200" b="0" i="0" kern="1200">
+                <a:solidFill>
+                  <a:schemeClr val="tx1">
+                    <a:tint val="75000"/>
+                  </a:schemeClr>
+                </a:solidFill>
+                <a:latin typeface="+mn-lt"/>
+                <a:ea typeface="+mn-ea"/>
+                <a:cs typeface="+mn-cs"/>
+              </a:defRPr>
+            </a:lvl5pPr>
+            <a:lvl6pPr marL="2286000" indent="0" algn="ctr" defTabSz="457200" rtl="0" eaLnBrk="1" latinLnBrk="0" hangingPunct="1">
+              <a:spcBef>
+                <a:spcPts val="1000"/>
+              </a:spcBef>
+              <a:spcAft>
+                <a:spcPts val="0"/>
+              </a:spcAft>
+              <a:buClr>
+                <a:schemeClr val="accent1"/>
+              </a:buClr>
+              <a:buSzPct val="80000"/>
+              <a:buFont typeface="Wingdings 3" charset="2"/>
+              <a:buNone/>
+              <a:defRPr sz="1200" b="0" i="0" kern="1200">
+                <a:solidFill>
+                  <a:schemeClr val="tx1">
+                    <a:tint val="75000"/>
+                  </a:schemeClr>
+                </a:solidFill>
+                <a:latin typeface="+mn-lt"/>
+                <a:ea typeface="+mn-ea"/>
+                <a:cs typeface="+mn-cs"/>
+              </a:defRPr>
+            </a:lvl6pPr>
+            <a:lvl7pPr marL="2743200" indent="0" algn="ctr" defTabSz="457200" rtl="0" eaLnBrk="1" latinLnBrk="0" hangingPunct="1">
+              <a:spcBef>
+                <a:spcPts val="1000"/>
+              </a:spcBef>
+              <a:spcAft>
+                <a:spcPts val="0"/>
+              </a:spcAft>
+              <a:buClr>
+                <a:schemeClr val="accent1"/>
+              </a:buClr>
+              <a:buSzPct val="80000"/>
+              <a:buFont typeface="Wingdings 3" charset="2"/>
+              <a:buNone/>
+              <a:defRPr sz="1200" b="0" i="0" kern="1200">
+                <a:solidFill>
+                  <a:schemeClr val="tx1">
+                    <a:tint val="75000"/>
+                  </a:schemeClr>
+                </a:solidFill>
+                <a:latin typeface="+mn-lt"/>
+                <a:ea typeface="+mn-ea"/>
+                <a:cs typeface="+mn-cs"/>
+              </a:defRPr>
+            </a:lvl7pPr>
+            <a:lvl8pPr marL="3200400" indent="0" algn="ctr" defTabSz="457200" rtl="0" eaLnBrk="1" latinLnBrk="0" hangingPunct="1">
+              <a:spcBef>
+                <a:spcPts val="1000"/>
+              </a:spcBef>
+              <a:spcAft>
+                <a:spcPts val="0"/>
+              </a:spcAft>
+              <a:buClr>
+                <a:schemeClr val="accent1"/>
+              </a:buClr>
+              <a:buSzPct val="80000"/>
+              <a:buFont typeface="Wingdings 3" charset="2"/>
+              <a:buNone/>
+              <a:defRPr sz="1200" b="0" i="0" kern="1200">
+                <a:solidFill>
+                  <a:schemeClr val="tx1">
+                    <a:tint val="75000"/>
+                  </a:schemeClr>
+                </a:solidFill>
+                <a:latin typeface="+mn-lt"/>
+                <a:ea typeface="+mn-ea"/>
+                <a:cs typeface="+mn-cs"/>
+              </a:defRPr>
+            </a:lvl8pPr>
+            <a:lvl9pPr marL="3657600" indent="0" algn="ctr" defTabSz="457200" rtl="0" eaLnBrk="1" latinLnBrk="0" hangingPunct="1">
+              <a:spcBef>
+                <a:spcPts val="1000"/>
+              </a:spcBef>
+              <a:spcAft>
+                <a:spcPts val="0"/>
+              </a:spcAft>
+              <a:buClr>
+                <a:schemeClr val="accent1"/>
+              </a:buClr>
+              <a:buSzPct val="80000"/>
+              <a:buFont typeface="Wingdings 3" charset="2"/>
+              <a:buNone/>
+              <a:defRPr sz="1200" b="0" i="0" kern="1200">
+                <a:solidFill>
+                  <a:schemeClr val="tx1">
+                    <a:tint val="75000"/>
+                  </a:schemeClr>
+                </a:solidFill>
+                <a:latin typeface="+mn-lt"/>
+                <a:ea typeface="+mn-ea"/>
+                <a:cs typeface="+mn-cs"/>
+              </a:defRPr>
+            </a:lvl9pPr>
+          </a:lstStyle>
+          <a:p>
+            <a:r>
+              <a:rPr lang="de-DE" cap="none" dirty="0"/>
+              <a:t>Test erster Text / </a:t>
+            </a:r>
+            <a:r>
+              <a:rPr lang="de-DE" cap="none" dirty="0" err="1"/>
+              <a:t>chalk</a:t>
+            </a:r>
+            <a:endParaRPr lang="de-DE" cap="none" dirty="0"/>
+          </a:p>
+          <a:p>
+            <a:pPr marL="285750" indent="-285750">
+              <a:buFont typeface="Wingdings" pitchFamily="2" charset="2"/>
+              <a:buChar char="è"/>
+            </a:pPr>
+            <a:endParaRPr lang="de-DE" cap="none" dirty="0"/>
+          </a:p>
+        </p:txBody>
+      </p:sp>
     </p:spTree>
     <p:extLst>
       <p:ext uri="{BB962C8B-B14F-4D97-AF65-F5344CB8AC3E}">

</xml_diff>